<commit_message>
🌐 i18n + 🔔 subcriptions
</commit_message>
<xml_diff>
--- a/static/logo.pptx
+++ b/static/logo.pptx
@@ -3204,7 +3204,7 @@
         </p:nvSpPr>
         <p:spPr bwMode="auto">
           <a:xfrm flipH="0" flipV="0">
-            <a:off x="3877261" y="2182656"/>
+            <a:off x="390925" y="471854"/>
             <a:ext cx="2479018" cy="1554840"/>
           </a:xfrm>
           <a:prstGeom prst="rect">
@@ -3248,7 +3248,7 @@
         </p:nvSpPr>
         <p:spPr bwMode="auto">
           <a:xfrm flipH="0" flipV="0">
-            <a:off x="4630674" y="2850058"/>
+            <a:off x="1144338" y="1139256"/>
             <a:ext cx="486095" cy="1554840"/>
           </a:xfrm>
           <a:prstGeom prst="rect">
@@ -3281,6 +3281,93 @@
               <a:latin typeface="Milesbingo Demo"/>
               <a:cs typeface="Milesbingo Demo"/>
             </a:endParaRPr>
+          </a:p>
+        </p:txBody>
+      </p:sp>
+      <p:pic>
+        <p:nvPicPr>
+          <p:cNvPr id="48347864" name=""/>
+          <p:cNvPicPr>
+            <a:picLocks noChangeAspect="1"/>
+          </p:cNvPicPr>
+          <p:nvPr/>
+        </p:nvPicPr>
+        <p:blipFill>
+          <a:blip r:embed="rId2"/>
+          <a:stretch/>
+        </p:blipFill>
+        <p:spPr bwMode="auto">
+          <a:xfrm flipH="1" flipV="0">
+            <a:off x="6289295" y="2694096"/>
+            <a:ext cx="3735072" cy="3735072"/>
+          </a:xfrm>
+          <a:prstGeom prst="rect">
+            <a:avLst/>
+          </a:prstGeom>
+        </p:spPr>
+      </p:pic>
+      <p:sp>
+        <p:nvSpPr>
+          <p:cNvPr id="513529571" name=""/>
+          <p:cNvSpPr/>
+          <p:nvPr/>
+        </p:nvSpPr>
+        <p:spPr bwMode="auto">
+          <a:xfrm flipH="1" flipV="0">
+            <a:off x="4647851" y="539412"/>
+            <a:ext cx="3282888" cy="2154684"/>
+          </a:xfrm>
+          <a:prstGeom prst="wedgeEllipseCallout">
+            <a:avLst>
+              <a:gd name="adj1" fmla="val -20833"/>
+              <a:gd name="adj2" fmla="val 62500"/>
+            </a:avLst>
+          </a:prstGeom>
+          <a:solidFill>
+            <a:schemeClr val="bg1"/>
+          </a:solidFill>
+          <a:ln w="12700" cap="flat" cmpd="sng" algn="ctr">
+            <a:solidFill>
+              <a:srgbClr val="3FB945"/>
+            </a:solidFill>
+            <a:prstDash val="solid"/>
+            <a:miter lim="800000"/>
+          </a:ln>
+        </p:spPr>
+        <p:style>
+          <a:lnRef idx="2">
+            <a:schemeClr val="accent1">
+              <a:shade val="50000"/>
+            </a:schemeClr>
+          </a:lnRef>
+          <a:fillRef idx="1">
+            <a:schemeClr val="accent1"/>
+          </a:fillRef>
+          <a:effectRef idx="0">
+            <a:schemeClr val="accent1"/>
+          </a:effectRef>
+          <a:fontRef idx="minor">
+            <a:schemeClr val="lt1"/>
+          </a:fontRef>
+        </p:style>
+        <p:txBody>
+          <a:bodyPr vertOverflow="overflow" horzOverflow="overflow" vert="horz" wrap="square" lIns="91440" tIns="45720" rIns="91440" bIns="45720" numCol="1" spcCol="0" rtlCol="0" fromWordArt="0" anchor="ctr" anchorCtr="0" forceAA="0" upright="0" compatLnSpc="0"/>
+          <a:p>
+            <a:pPr algn="ctr">
+              <a:defRPr/>
+            </a:pPr>
+            <a:r>
+              <a:rPr lang="fr-FR" sz="1800" b="0" i="0" u="none" strike="noStrike" cap="none" spc="0">
+                <a:solidFill>
+                  <a:schemeClr val="tx1"/>
+                </a:solidFill>
+                <a:latin typeface="Ysabeau SC"/>
+                <a:ea typeface="Arial"/>
+                <a:cs typeface="Ysabeau SC"/>
+              </a:rPr>
+              <a:t>Add me to your home screen to enjoy all features</a:t>
+            </a:r>
+            <a:endParaRPr/>
           </a:p>
         </p:txBody>
       </p:sp>

</xml_diff>